<commit_message>
Update RAG lab slide pack
</commit_message>
<xml_diff>
--- a/slides/Intro_to_RAG_Lab_Tutorial.pptx
+++ b/slides/Intro_to_RAG_Lab_Tutorial.pptx
@@ -5,23 +5,24 @@
     <p:sldMasterId id="2147483648" r:id="rId1"/>
   </p:sldMasterIdLst>
   <p:sldIdLst>
-    <p:sldId id="256" r:id="rId2"/>
-    <p:sldId id="258" r:id="rId3"/>
-    <p:sldId id="257" r:id="rId4"/>
-    <p:sldId id="270" r:id="rId5"/>
-    <p:sldId id="271" r:id="rId6"/>
-    <p:sldId id="272" r:id="rId7"/>
-    <p:sldId id="259" r:id="rId8"/>
-    <p:sldId id="260" r:id="rId9"/>
-    <p:sldId id="261" r:id="rId10"/>
-    <p:sldId id="262" r:id="rId11"/>
-    <p:sldId id="263" r:id="rId12"/>
-    <p:sldId id="264" r:id="rId13"/>
-    <p:sldId id="265" r:id="rId14"/>
-    <p:sldId id="266" r:id="rId15"/>
-    <p:sldId id="267" r:id="rId16"/>
-    <p:sldId id="268" r:id="rId17"/>
-    <p:sldId id="269" r:id="rId18"/>
+    <p:sldId id="273" r:id="rId2"/>
+    <p:sldId id="256" r:id="rId3"/>
+    <p:sldId id="258" r:id="rId4"/>
+    <p:sldId id="257" r:id="rId5"/>
+    <p:sldId id="270" r:id="rId6"/>
+    <p:sldId id="271" r:id="rId7"/>
+    <p:sldId id="272" r:id="rId8"/>
+    <p:sldId id="259" r:id="rId9"/>
+    <p:sldId id="260" r:id="rId10"/>
+    <p:sldId id="261" r:id="rId11"/>
+    <p:sldId id="262" r:id="rId12"/>
+    <p:sldId id="263" r:id="rId13"/>
+    <p:sldId id="264" r:id="rId14"/>
+    <p:sldId id="265" r:id="rId15"/>
+    <p:sldId id="266" r:id="rId16"/>
+    <p:sldId id="267" r:id="rId17"/>
+    <p:sldId id="268" r:id="rId18"/>
+    <p:sldId id="269" r:id="rId19"/>
   </p:sldIdLst>
   <p:sldSz cx="9144000" cy="6858000" type="screen4x3"/>
   <p:notesSz cx="6858000" cy="9144000"/>
@@ -143,6 +144,7 @@
 <p1510:revInfo xmlns:a="http://schemas.openxmlformats.org/drawingml/2006/main" xmlns:r="http://schemas.openxmlformats.org/officeDocument/2006/relationships" xmlns:p1510="http://schemas.microsoft.com/office/powerpoint/2015/10/main">
   <p1510:revLst>
     <p1510:client id="{68C4D72A-ABCC-4E0C-8513-F8CD79C92EDC}" v="307" dt="2026-01-12T08:46:40.112"/>
+    <p1510:client id="{85DBF608-7BA4-4ADF-BCF4-93C33E94FF5C}" v="5" dt="2026-01-12T11:38:33.367"/>
     <p1510:client id="{A0FE9BE8-D9BB-44EF-832E-B6F16F9E9B5D}" v="110" dt="2026-01-12T08:58:35.510"/>
   </p1510:revLst>
 </p1510:revInfo>
@@ -3115,84 +3117,42 @@
           <a:chExt cx="0" cy="0"/>
         </a:xfrm>
       </p:grpSpPr>
-      <p:sp>
-        <p:nvSpPr>
-          <p:cNvPr id="2" name="Title 1"/>
-          <p:cNvSpPr>
-            <a:spLocks noGrp="1"/>
-          </p:cNvSpPr>
-          <p:nvPr>
-            <p:ph type="title"/>
-          </p:nvPr>
-        </p:nvSpPr>
-        <p:spPr/>
-        <p:txBody>
-          <a:bodyPr/>
-          <a:lstStyle/>
-          <a:p>
-            <a:r>
-              <a:t>Retrieval-Augmented Generation (RAG)</a:t>
-            </a:r>
-          </a:p>
-        </p:txBody>
-      </p:sp>
-      <p:sp>
-        <p:nvSpPr>
-          <p:cNvPr id="3" name="Content Placeholder 2"/>
-          <p:cNvSpPr>
-            <a:spLocks noGrp="1"/>
-          </p:cNvSpPr>
-          <p:nvPr>
-            <p:ph idx="1"/>
-          </p:nvPr>
-        </p:nvSpPr>
-        <p:spPr/>
-        <p:txBody>
-          <a:bodyPr vert="horz" lIns="91440" tIns="45720" rIns="91440" bIns="45720" rtlCol="0" anchor="t">
-            <a:normAutofit/>
-          </a:bodyPr>
-          <a:lstStyle/>
-          <a:p>
-            <a:r>
-              <a:rPr dirty="0"/>
-              <a:t>Course: Introduction to RAG for Beginners</a:t>
-            </a:r>
-          </a:p>
-          <a:p>
-            <a:r>
-              <a:rPr dirty="0"/>
-              <a:t>Goal: Understand how modern AI </a:t>
-            </a:r>
-            <a:r>
-              <a:rPr lang="en-US" dirty="0"/>
-              <a:t>analyzes enterprise documents and answers</a:t>
-            </a:r>
-            <a:r>
-              <a:rPr dirty="0"/>
-              <a:t> </a:t>
-            </a:r>
-            <a:r>
-              <a:rPr lang="en-US" dirty="0"/>
-              <a:t>questions</a:t>
-            </a:r>
-          </a:p>
-          <a:p>
-            <a:r>
-              <a:rPr lang="en-US" dirty="0"/>
-              <a:t>Prerequisites: No</a:t>
-            </a:r>
-            <a:r>
-              <a:rPr dirty="0"/>
-              <a:t> coding required – focus on concepts and system behavior</a:t>
-            </a:r>
-            <a:endParaRPr>
-              <a:ea typeface="Calibri"/>
-              <a:cs typeface="Calibri"/>
-            </a:endParaRPr>
-          </a:p>
-        </p:txBody>
-      </p:sp>
+      <p:pic>
+        <p:nvPicPr>
+          <p:cNvPr id="4" name="Picture 3">
+            <a:extLst>
+              <a:ext uri="{FF2B5EF4-FFF2-40B4-BE49-F238E27FC236}">
+                <a16:creationId xmlns:a16="http://schemas.microsoft.com/office/drawing/2014/main" id="{56B533F5-0D94-E80A-56FB-EB4F18229962}"/>
+              </a:ext>
+            </a:extLst>
+          </p:cNvPr>
+          <p:cNvPicPr>
+            <a:picLocks noChangeAspect="1"/>
+          </p:cNvPicPr>
+          <p:nvPr/>
+        </p:nvPicPr>
+        <p:blipFill>
+          <a:blip r:embed="rId2"/>
+          <a:stretch>
+            <a:fillRect/>
+          </a:stretch>
+        </p:blipFill>
+        <p:spPr>
+          <a:xfrm>
+            <a:off x="0" y="381000"/>
+            <a:ext cx="9144000" cy="6096000"/>
+          </a:xfrm>
+          <a:prstGeom prst="rect">
+            <a:avLst/>
+          </a:prstGeom>
+        </p:spPr>
+      </p:pic>
     </p:spTree>
+    <p:extLst>
+      <p:ext uri="{BB962C8B-B14F-4D97-AF65-F5344CB8AC3E}">
+        <p14:creationId xmlns:p14="http://schemas.microsoft.com/office/powerpoint/2010/main" val="539848783"/>
+      </p:ext>
+    </p:extLst>
   </p:cSld>
   <p:clrMapOvr>
     <a:masterClrMapping/>
@@ -3233,7 +3193,7 @@
           <a:lstStyle/>
           <a:p>
             <a:r>
-              <a:t>Embeddings Explained</a:t>
+              <a:t>Why Chunking Matters</a:t>
             </a:r>
           </a:p>
         </p:txBody>
@@ -3254,17 +3214,17 @@
           <a:lstStyle/>
           <a:p>
             <a:r>
-              <a:t>Embeddings convert text into numbers</a:t>
-            </a:r>
-          </a:p>
-          <a:p>
-            <a:r>
-              <a:t>Similar meanings produce similar vectors</a:t>
-            </a:r>
-          </a:p>
-          <a:p>
-            <a:r>
-              <a:t>Enables semantic (meaning-based) search</a:t>
+              <a:t>LLMs have input size limits</a:t>
+            </a:r>
+          </a:p>
+          <a:p>
+            <a:r>
+              <a:t>Smaller chunks improve retrieval accuracy</a:t>
+            </a:r>
+          </a:p>
+          <a:p>
+            <a:r>
+              <a:t>Industry systems retrieve chunks, not full documents</a:t>
             </a:r>
           </a:p>
         </p:txBody>
@@ -3310,7 +3270,7 @@
           <a:lstStyle/>
           <a:p>
             <a:r>
-              <a:t>Vector Databases</a:t>
+              <a:t>Embeddings Explained</a:t>
             </a:r>
           </a:p>
         </p:txBody>
@@ -3331,17 +3291,17 @@
           <a:lstStyle/>
           <a:p>
             <a:r>
-              <a:t>Store embeddings and metadata</a:t>
-            </a:r>
-          </a:p>
-          <a:p>
-            <a:r>
-              <a:t>Enable fast similarity search</a:t>
-            </a:r>
-          </a:p>
-          <a:p>
-            <a:r>
-              <a:t>Examples: Chroma, Pinecone, Weaviate, pgvector</a:t>
+              <a:t>Embeddings convert text into numbers</a:t>
+            </a:r>
+          </a:p>
+          <a:p>
+            <a:r>
+              <a:t>Similar meanings produce similar vectors</a:t>
+            </a:r>
+          </a:p>
+          <a:p>
+            <a:r>
+              <a:t>Enables semantic (meaning-based) search</a:t>
             </a:r>
           </a:p>
         </p:txBody>
@@ -3387,7 +3347,7 @@
           <a:lstStyle/>
           <a:p>
             <a:r>
-              <a:t>Querying Phase (query.py)</a:t>
+              <a:t>Vector Databases</a:t>
             </a:r>
           </a:p>
         </p:txBody>
@@ -3408,22 +3368,17 @@
           <a:lstStyle/>
           <a:p>
             <a:r>
-              <a:t>Runs every time a user asks a question</a:t>
-            </a:r>
-          </a:p>
-          <a:p>
-            <a:r>
-              <a:t>Embeds the question</a:t>
-            </a:r>
-          </a:p>
-          <a:p>
-            <a:r>
-              <a:t>Retrieves relevant chunks</a:t>
-            </a:r>
-          </a:p>
-          <a:p>
-            <a:r>
-              <a:t>Uses an LLM to generate a grounded answer</a:t>
+              <a:t>Store embeddings and metadata</a:t>
+            </a:r>
+          </a:p>
+          <a:p>
+            <a:r>
+              <a:t>Enable fast similarity search</a:t>
+            </a:r>
+          </a:p>
+          <a:p>
+            <a:r>
+              <a:t>Examples: Chroma, Pinecone, Weaviate, pgvector</a:t>
             </a:r>
           </a:p>
         </p:txBody>
@@ -3469,7 +3424,7 @@
           <a:lstStyle/>
           <a:p>
             <a:r>
-              <a:t>Why Retrieval Comes First</a:t>
+              <a:t>Querying Phase (query.py)</a:t>
             </a:r>
           </a:p>
         </p:txBody>
@@ -3490,17 +3445,22 @@
           <a:lstStyle/>
           <a:p>
             <a:r>
-              <a:t>The model can only answer using retrieved data</a:t>
-            </a:r>
-          </a:p>
-          <a:p>
-            <a:r>
-              <a:t>Better retrieval = better answers</a:t>
-            </a:r>
-          </a:p>
-          <a:p>
-            <a:r>
-              <a:t>Retrieval quality matters more than model size</a:t>
+              <a:t>Runs every time a user asks a question</a:t>
+            </a:r>
+          </a:p>
+          <a:p>
+            <a:r>
+              <a:t>Embeds the question</a:t>
+            </a:r>
+          </a:p>
+          <a:p>
+            <a:r>
+              <a:t>Retrieves relevant chunks</a:t>
+            </a:r>
+          </a:p>
+          <a:p>
+            <a:r>
+              <a:t>Uses an LLM to generate a grounded answer</a:t>
             </a:r>
           </a:p>
         </p:txBody>
@@ -3546,7 +3506,7 @@
           <a:lstStyle/>
           <a:p>
             <a:r>
-              <a:t>Metadata and Citations</a:t>
+              <a:t>Why Retrieval Comes First</a:t>
             </a:r>
           </a:p>
         </p:txBody>
@@ -3567,17 +3527,17 @@
           <a:lstStyle/>
           <a:p>
             <a:r>
-              <a:t>Metadata tracks source and page number</a:t>
-            </a:r>
-          </a:p>
-          <a:p>
-            <a:r>
-              <a:t>Enables citations and trust</a:t>
-            </a:r>
-          </a:p>
-          <a:p>
-            <a:r>
-              <a:t>Required for enterprise and compliance use cases</a:t>
+              <a:t>The model can only answer using retrieved data</a:t>
+            </a:r>
+          </a:p>
+          <a:p>
+            <a:r>
+              <a:t>Better retrieval = better answers</a:t>
+            </a:r>
+          </a:p>
+          <a:p>
+            <a:r>
+              <a:t>Retrieval quality matters more than model size</a:t>
             </a:r>
           </a:p>
         </p:txBody>
@@ -3623,7 +3583,7 @@
           <a:lstStyle/>
           <a:p>
             <a:r>
-              <a:t>Industry Best Practices in RAG</a:t>
+              <a:t>Metadata and Citations</a:t>
             </a:r>
           </a:p>
         </p:txBody>
@@ -3644,22 +3604,17 @@
           <a:lstStyle/>
           <a:p>
             <a:r>
-              <a:t>Separate indexing and querying</a:t>
-            </a:r>
-          </a:p>
-          <a:p>
-            <a:r>
-              <a:t>Idempotent indexing (safe re-runs)</a:t>
-            </a:r>
-          </a:p>
-          <a:p>
-            <a:r>
-              <a:t>Persistent vector databases</a:t>
-            </a:r>
-          </a:p>
-          <a:p>
-            <a:r>
-              <a:t>Grounded answer generation</a:t>
+              <a:t>Metadata tracks source and page number</a:t>
+            </a:r>
+          </a:p>
+          <a:p>
+            <a:r>
+              <a:t>Enables citations and trust</a:t>
+            </a:r>
+          </a:p>
+          <a:p>
+            <a:r>
+              <a:t>Required for enterprise and compliance use cases</a:t>
             </a:r>
           </a:p>
         </p:txBody>
@@ -3705,7 +3660,7 @@
           <a:lstStyle/>
           <a:p>
             <a:r>
-              <a:t>What You Built Conceptually</a:t>
+              <a:t>Industry Best Practices in RAG</a:t>
             </a:r>
           </a:p>
         </p:txBody>
@@ -3726,17 +3681,22 @@
           <a:lstStyle/>
           <a:p>
             <a:r>
-              <a:t>A real-world RAG architecture</a:t>
-            </a:r>
-          </a:p>
-          <a:p>
-            <a:r>
-              <a:t>A system that avoids hallucinations</a:t>
-            </a:r>
-          </a:p>
-          <a:p>
-            <a:r>
-              <a:t>A foundation used in enterprise AI systems</a:t>
+              <a:t>Separate indexing and querying</a:t>
+            </a:r>
+          </a:p>
+          <a:p>
+            <a:r>
+              <a:t>Idempotent indexing (safe re-runs)</a:t>
+            </a:r>
+          </a:p>
+          <a:p>
+            <a:r>
+              <a:t>Persistent vector databases</a:t>
+            </a:r>
+          </a:p>
+          <a:p>
+            <a:r>
+              <a:t>Grounded answer generation</a:t>
             </a:r>
           </a:p>
         </p:txBody>
@@ -3782,6 +3742,83 @@
           <a:lstStyle/>
           <a:p>
             <a:r>
+              <a:t>What You Built Conceptually</a:t>
+            </a:r>
+          </a:p>
+        </p:txBody>
+      </p:sp>
+      <p:sp>
+        <p:nvSpPr>
+          <p:cNvPr id="3" name="Content Placeholder 2"/>
+          <p:cNvSpPr>
+            <a:spLocks noGrp="1"/>
+          </p:cNvSpPr>
+          <p:nvPr>
+            <p:ph idx="1"/>
+          </p:nvPr>
+        </p:nvSpPr>
+        <p:spPr/>
+        <p:txBody>
+          <a:bodyPr/>
+          <a:lstStyle/>
+          <a:p>
+            <a:r>
+              <a:t>A real-world RAG architecture</a:t>
+            </a:r>
+          </a:p>
+          <a:p>
+            <a:r>
+              <a:t>A system that avoids hallucinations</a:t>
+            </a:r>
+          </a:p>
+          <a:p>
+            <a:r>
+              <a:t>A foundation used in enterprise AI systems</a:t>
+            </a:r>
+          </a:p>
+        </p:txBody>
+      </p:sp>
+    </p:spTree>
+  </p:cSld>
+  <p:clrMapOvr>
+    <a:masterClrMapping/>
+  </p:clrMapOvr>
+</p:sld>
+</file>
+
+<file path=ppt/slides/slide18.xml><?xml version="1.0" encoding="utf-8"?>
+<p:sld xmlns:a="http://schemas.openxmlformats.org/drawingml/2006/main" xmlns:r="http://schemas.openxmlformats.org/officeDocument/2006/relationships" xmlns:p="http://schemas.openxmlformats.org/presentationml/2006/main">
+  <p:cSld>
+    <p:spTree>
+      <p:nvGrpSpPr>
+        <p:cNvPr id="1" name=""/>
+        <p:cNvGrpSpPr/>
+        <p:nvPr/>
+      </p:nvGrpSpPr>
+      <p:grpSpPr>
+        <a:xfrm>
+          <a:off x="0" y="0"/>
+          <a:ext cx="0" cy="0"/>
+          <a:chOff x="0" y="0"/>
+          <a:chExt cx="0" cy="0"/>
+        </a:xfrm>
+      </p:grpSpPr>
+      <p:sp>
+        <p:nvSpPr>
+          <p:cNvPr id="2" name="Title 1"/>
+          <p:cNvSpPr>
+            <a:spLocks noGrp="1"/>
+          </p:cNvSpPr>
+          <p:nvPr>
+            <p:ph type="title"/>
+          </p:nvPr>
+        </p:nvSpPr>
+        <p:spPr/>
+        <p:txBody>
+          <a:bodyPr/>
+          <a:lstStyle/>
+          <a:p>
+            <a:r>
               <a:t>Next Steps</a:t>
             </a:r>
           </a:p>
@@ -3805,14 +3842,14 @@
           <a:lstStyle/>
           <a:p>
             <a:r>
-              <a:rPr lang="en-US" dirty="0"/>
+              <a:rPr lang="en-US"/>
               <a:t>Visualization embeddings (optional function)</a:t>
             </a:r>
-            <a:endParaRPr dirty="0"/>
-          </a:p>
-          <a:p>
-            <a:r>
-              <a:rPr lang="en-US" dirty="0">
+            <a:endParaRPr/>
+          </a:p>
+          <a:p>
+            <a:r>
+              <a:rPr lang="en-US">
                 <a:ea typeface="Calibri"/>
                 <a:cs typeface="Calibri"/>
               </a:rPr>
@@ -3821,20 +3858,18 @@
           </a:p>
           <a:p>
             <a:r>
-              <a:rPr dirty="0"/>
               <a:t>Reranking and evaluation</a:t>
             </a:r>
-            <a:endParaRPr dirty="0">
+            <a:endParaRPr>
               <a:ea typeface="Calibri"/>
               <a:cs typeface="Calibri"/>
             </a:endParaRPr>
           </a:p>
           <a:p>
             <a:r>
-              <a:rPr dirty="0"/>
               <a:t>Deploy as an API service</a:t>
             </a:r>
-            <a:endParaRPr dirty="0">
+            <a:endParaRPr>
               <a:ea typeface="Calibri"/>
               <a:cs typeface="Calibri"/>
             </a:endParaRPr>
@@ -3882,7 +3917,7 @@
           <a:lstStyle/>
           <a:p>
             <a:r>
-              <a:t>What is RAG?</a:t>
+              <a:t>Retrieval-Augmented Generation (RAG)</a:t>
             </a:r>
           </a:p>
         </p:txBody>
@@ -3905,35 +3940,34 @@
           <a:lstStyle/>
           <a:p>
             <a:r>
-              <a:rPr dirty="0"/>
-              <a:t>RAG = Retrieval + Generation</a:t>
-            </a:r>
-          </a:p>
-          <a:p>
-            <a:r>
-              <a:rPr dirty="0"/>
-              <a:t>Retrieve relevant information </a:t>
-            </a:r>
-            <a:r>
-              <a:rPr lang="en-US" dirty="0"/>
-              <a:t>from documents first</a:t>
-            </a:r>
-            <a:endParaRPr dirty="0"/>
-          </a:p>
-          <a:p>
-            <a:r>
-              <a:rPr dirty="0"/>
-              <a:t>Generate </a:t>
-            </a:r>
-            <a:r>
-              <a:rPr lang="en-US" dirty="0"/>
-              <a:t>augmented answers</a:t>
-            </a:r>
-            <a:r>
-              <a:rPr dirty="0"/>
-              <a:t> using retrieved context only</a:t>
-            </a:r>
-            <a:endParaRPr dirty="0">
+              <a:t>Course: Introduction to RAG for Beginners</a:t>
+            </a:r>
+          </a:p>
+          <a:p>
+            <a:r>
+              <a:t>Goal: Understand how modern AI </a:t>
+            </a:r>
+            <a:r>
+              <a:rPr lang="en-US"/>
+              <a:t>analyzes enterprise documents and answers</a:t>
+            </a:r>
+            <a:r>
+              <a:t> </a:t>
+            </a:r>
+            <a:r>
+              <a:rPr lang="en-US"/>
+              <a:t>questions</a:t>
+            </a:r>
+          </a:p>
+          <a:p>
+            <a:r>
+              <a:rPr lang="en-US"/>
+              <a:t>Prerequisites: No</a:t>
+            </a:r>
+            <a:r>
+              <a:t> coding required – focus on concepts and system behavior</a:t>
+            </a:r>
+            <a:endParaRPr>
               <a:ea typeface="Calibri"/>
               <a:cs typeface="Calibri"/>
             </a:endParaRPr>
@@ -3981,7 +4015,7 @@
           <a:lstStyle/>
           <a:p>
             <a:r>
-              <a:t>Why RAG Exists</a:t>
+              <a:t>What is RAG?</a:t>
             </a:r>
           </a:p>
         </p:txBody>
@@ -4004,58 +4038,31 @@
           <a:lstStyle/>
           <a:p>
             <a:r>
-              <a:rPr dirty="0"/>
-              <a:t>LLMs </a:t>
-            </a:r>
-            <a:r>
-              <a:rPr lang="en-US" dirty="0"/>
-              <a:t>memory does not include</a:t>
-            </a:r>
-            <a:r>
-              <a:rPr dirty="0"/>
-              <a:t> your private documents</a:t>
-            </a:r>
-          </a:p>
-          <a:p>
-            <a:r>
-              <a:rPr dirty="0"/>
-              <a:t>LLMs may hallucinate</a:t>
-            </a:r>
-            <a:r>
-              <a:rPr lang="en-US" dirty="0"/>
-              <a:t> in</a:t>
-            </a:r>
-            <a:r>
-              <a:rPr dirty="0"/>
-              <a:t> </a:t>
-            </a:r>
-            <a:r>
-              <a:rPr lang="en-US" dirty="0"/>
-              <a:t>confidence</a:t>
-            </a:r>
-            <a:r>
-              <a:rPr dirty="0"/>
-              <a:t> but </a:t>
-            </a:r>
-            <a:r>
-              <a:rPr lang="en-US" dirty="0"/>
-              <a:t>give incorrect</a:t>
-            </a:r>
-            <a:r>
-              <a:rPr dirty="0"/>
-              <a:t> answers</a:t>
+              <a:t>RAG = Retrieval + Generation</a:t>
+            </a:r>
+          </a:p>
+          <a:p>
+            <a:r>
+              <a:t>Retrieve relevant information </a:t>
+            </a:r>
+            <a:r>
+              <a:rPr lang="en-US"/>
+              <a:t>from documents first</a:t>
+            </a:r>
+            <a:endParaRPr/>
+          </a:p>
+          <a:p>
+            <a:r>
+              <a:t>Generate </a:t>
+            </a:r>
+            <a:r>
+              <a:rPr lang="en-US"/>
+              <a:t>augmented answers</a:t>
+            </a:r>
+            <a:r>
+              <a:t> using retrieved context only</a:t>
             </a:r>
             <a:endParaRPr>
-              <a:ea typeface="Calibri"/>
-              <a:cs typeface="Calibri"/>
-            </a:endParaRPr>
-          </a:p>
-          <a:p>
-            <a:r>
-              <a:rPr dirty="0"/>
-              <a:t>RAG grounds AI answers in real, retrievable data</a:t>
-            </a:r>
-            <a:endParaRPr dirty="0">
               <a:ea typeface="Calibri"/>
               <a:cs typeface="Calibri"/>
             </a:endParaRPr>
@@ -4089,13 +4096,7 @@
       </p:grpSpPr>
       <p:sp>
         <p:nvSpPr>
-          <p:cNvPr id="2" name="Title 1">
-            <a:extLst>
-              <a:ext uri="{FF2B5EF4-FFF2-40B4-BE49-F238E27FC236}">
-                <a16:creationId xmlns:a16="http://schemas.microsoft.com/office/drawing/2014/main" id="{7F941BAB-B504-D1F7-16F0-B37146A1C4DA}"/>
-              </a:ext>
-            </a:extLst>
-          </p:cNvPr>
+          <p:cNvPr id="2" name="Title 1"/>
           <p:cNvSpPr>
             <a:spLocks noGrp="1"/>
           </p:cNvSpPr>
@@ -4109,25 +4110,14 @@
           <a:lstStyle/>
           <a:p>
             <a:r>
-              <a:rPr lang="en-US" dirty="0">
-                <a:ea typeface="Calibri"/>
-                <a:cs typeface="Calibri"/>
-              </a:rPr>
-              <a:t>Enterprise Use Case 1</a:t>
-            </a:r>
-            <a:endParaRPr lang="en-US" dirty="0"/>
-          </a:p>
-        </p:txBody>
-      </p:sp>
-      <p:sp>
-        <p:nvSpPr>
-          <p:cNvPr id="3" name="Content Placeholder 2">
-            <a:extLst>
-              <a:ext uri="{FF2B5EF4-FFF2-40B4-BE49-F238E27FC236}">
-                <a16:creationId xmlns:a16="http://schemas.microsoft.com/office/drawing/2014/main" id="{5BDAC2E4-CD0D-143D-0EAA-54C82B8FC24E}"/>
-              </a:ext>
-            </a:extLst>
-          </p:cNvPr>
+              <a:t>Why RAG Exists</a:t>
+            </a:r>
+          </a:p>
+        </p:txBody>
+      </p:sp>
+      <p:sp>
+        <p:nvSpPr>
+          <p:cNvPr id="3" name="Content Placeholder 2"/>
           <p:cNvSpPr>
             <a:spLocks noGrp="1"/>
           </p:cNvSpPr>
@@ -4138,173 +4128,63 @@
         <p:spPr/>
         <p:txBody>
           <a:bodyPr vert="horz" lIns="91440" tIns="45720" rIns="91440" bIns="45720" rtlCol="0" anchor="t">
-            <a:normAutofit fontScale="85000" lnSpcReduction="20000"/>
+            <a:normAutofit/>
           </a:bodyPr>
           <a:lstStyle/>
           <a:p>
             <a:r>
-              <a:rPr lang="en-US" dirty="0"/>
-              <a:t>Regulated Knowledge Assistant (Risk, Compliance, legal, finance &amp; other corporate functions)</a:t>
-            </a:r>
-            <a:endParaRPr lang="en-US" dirty="0">
+              <a:t>LLMs </a:t>
+            </a:r>
+            <a:r>
+              <a:rPr lang="en-US"/>
+              <a:t>memory does not include</a:t>
+            </a:r>
+            <a:r>
+              <a:t> your private documents</a:t>
+            </a:r>
+          </a:p>
+          <a:p>
+            <a:r>
+              <a:t>LLMs may hallucinate</a:t>
+            </a:r>
+            <a:r>
+              <a:rPr lang="en-US"/>
+              <a:t> in</a:t>
+            </a:r>
+            <a:r>
+              <a:t> </a:t>
+            </a:r>
+            <a:r>
+              <a:rPr lang="en-US"/>
+              <a:t>confidence</a:t>
+            </a:r>
+            <a:r>
+              <a:t> but </a:t>
+            </a:r>
+            <a:r>
+              <a:rPr lang="en-US"/>
+              <a:t>give incorrect</a:t>
+            </a:r>
+            <a:r>
+              <a:t> answers</a:t>
+            </a:r>
+            <a:endParaRPr>
               <a:ea typeface="Calibri"/>
               <a:cs typeface="Calibri"/>
             </a:endParaRPr>
           </a:p>
           <a:p>
             <a:r>
-              <a:rPr lang="en-US" dirty="0"/>
-              <a:t>What RAG enables</a:t>
-            </a:r>
-          </a:p>
-          <a:p>
-            <a:pPr lvl="1">
-              <a:buFont typeface="Calibri"/>
-              <a:buChar char="-"/>
-            </a:pPr>
-            <a:r>
-              <a:rPr lang="en-US" dirty="0">
-                <a:ea typeface="+mn-lt"/>
-                <a:cs typeface="+mn-lt"/>
-              </a:rPr>
-              <a:t>AI answers </a:t>
-            </a:r>
-            <a:r>
-              <a:rPr lang="en-US" b="1" dirty="0">
-                <a:ea typeface="+mn-lt"/>
-                <a:cs typeface="+mn-lt"/>
-              </a:rPr>
-              <a:t>only from approved internal documents</a:t>
-            </a:r>
-            <a:endParaRPr lang="en-US" dirty="0">
-              <a:ea typeface="+mn-lt"/>
-              <a:cs typeface="+mn-lt"/>
-            </a:endParaRPr>
-          </a:p>
-          <a:p>
-            <a:pPr lvl="1">
-              <a:buFont typeface="Calibri"/>
-              <a:buChar char="-"/>
-            </a:pPr>
-            <a:r>
-              <a:rPr lang="en-US" dirty="0">
-                <a:ea typeface="+mn-lt"/>
-                <a:cs typeface="+mn-lt"/>
-              </a:rPr>
-              <a:t>Every answer includes </a:t>
-            </a:r>
-            <a:r>
-              <a:rPr lang="en-US" b="1" dirty="0">
-                <a:ea typeface="+mn-lt"/>
-                <a:cs typeface="+mn-lt"/>
-              </a:rPr>
-              <a:t>citations</a:t>
-            </a:r>
-            <a:r>
-              <a:rPr lang="en-US" dirty="0">
-                <a:ea typeface="+mn-lt"/>
-                <a:cs typeface="+mn-lt"/>
-              </a:rPr>
-              <a:t> (page, policy, clause)</a:t>
-            </a:r>
-          </a:p>
-          <a:p>
-            <a:pPr lvl="1">
-              <a:buFont typeface="Calibri"/>
-              <a:buChar char="-"/>
-            </a:pPr>
-            <a:r>
-              <a:rPr lang="en-US" dirty="0">
-                <a:ea typeface="+mn-lt"/>
-                <a:cs typeface="+mn-lt"/>
-              </a:rPr>
-              <a:t>Governance controls who can ask what</a:t>
-            </a:r>
-          </a:p>
-          <a:p>
-            <a:r>
-              <a:rPr lang="en-US" dirty="0"/>
-              <a:t>Business value</a:t>
-            </a:r>
-          </a:p>
-          <a:p>
-            <a:pPr lvl="1">
-              <a:buFont typeface="Calibri"/>
-              <a:buChar char="-"/>
-            </a:pPr>
-            <a:r>
-              <a:rPr lang="en-US" dirty="0">
-                <a:ea typeface="+mn-lt"/>
-                <a:cs typeface="+mn-lt"/>
-              </a:rPr>
-              <a:t>Faster regulatory responses</a:t>
-            </a:r>
-          </a:p>
-          <a:p>
-            <a:pPr lvl="1">
-              <a:buFont typeface="Calibri"/>
-              <a:buChar char="-"/>
-            </a:pPr>
-            <a:r>
-              <a:rPr lang="en-US" dirty="0">
-                <a:ea typeface="+mn-lt"/>
-                <a:cs typeface="+mn-lt"/>
-              </a:rPr>
-              <a:t>Reduced legal/compliance risk</a:t>
-            </a:r>
-          </a:p>
-          <a:p>
-            <a:pPr lvl="1">
-              <a:buFont typeface="Calibri"/>
-              <a:buChar char="-"/>
-            </a:pPr>
-            <a:r>
-              <a:rPr lang="en-US" dirty="0">
-                <a:ea typeface="+mn-lt"/>
-                <a:cs typeface="+mn-lt"/>
-              </a:rPr>
-              <a:t>Lower dependency on SMEs for routine queries</a:t>
-            </a:r>
-          </a:p>
-          <a:p>
-            <a:pPr lvl="1">
-              <a:buFont typeface="Calibri"/>
-              <a:buChar char="-"/>
-            </a:pPr>
-            <a:r>
-              <a:rPr lang="en-US" dirty="0">
-                <a:ea typeface="+mn-lt"/>
-                <a:cs typeface="+mn-lt"/>
-              </a:rPr>
-              <a:t>Executive confidence in AI-assisted decisions</a:t>
-            </a:r>
-          </a:p>
-          <a:p>
-            <a:endParaRPr lang="en-US" dirty="0">
-              <a:ea typeface="+mn-lt"/>
-              <a:cs typeface="+mn-lt"/>
-            </a:endParaRPr>
-          </a:p>
-          <a:p>
-            <a:endParaRPr lang="en-US" dirty="0">
+              <a:t>RAG grounds AI answers in real, retrievable data</a:t>
+            </a:r>
+            <a:endParaRPr>
               <a:ea typeface="Calibri"/>
               <a:cs typeface="Calibri"/>
             </a:endParaRPr>
           </a:p>
-          <a:p>
-            <a:endParaRPr lang="en-US" dirty="0">
-              <a:ea typeface="Calibri"/>
-              <a:cs typeface="Calibri"/>
-            </a:endParaRPr>
-          </a:p>
         </p:txBody>
       </p:sp>
     </p:spTree>
-    <p:extLst>
-      <p:ext uri="{BB962C8B-B14F-4D97-AF65-F5344CB8AC3E}">
-        <p14:creationId xmlns:p14="http://schemas.microsoft.com/office/powerpoint/2010/main" val="293977368"/>
-      </p:ext>
-    </p:extLst>
   </p:cSld>
   <p:clrMapOvr>
     <a:masterClrMapping/>
@@ -4334,7 +4214,7 @@
           <p:cNvPr id="2" name="Title 1">
             <a:extLst>
               <a:ext uri="{FF2B5EF4-FFF2-40B4-BE49-F238E27FC236}">
-                <a16:creationId xmlns:a16="http://schemas.microsoft.com/office/drawing/2014/main" id="{36FF92C2-09A5-C977-2AAD-861A53CB0298}"/>
+                <a16:creationId xmlns:a16="http://schemas.microsoft.com/office/drawing/2014/main" id="{7F941BAB-B504-D1F7-16F0-B37146A1C4DA}"/>
               </a:ext>
             </a:extLst>
           </p:cNvPr>
@@ -4351,13 +4231,13 @@
           <a:lstStyle/>
           <a:p>
             <a:r>
-              <a:rPr lang="en-US" dirty="0">
+              <a:rPr lang="en-US">
                 <a:ea typeface="Calibri"/>
                 <a:cs typeface="Calibri"/>
               </a:rPr>
-              <a:t>Enterprise Use Case 2</a:t>
-            </a:r>
-            <a:endParaRPr lang="en-US" dirty="0"/>
+              <a:t>Enterprise Use Case 1</a:t>
+            </a:r>
+            <a:endParaRPr lang="en-US"/>
           </a:p>
         </p:txBody>
       </p:sp>
@@ -4366,7 +4246,7 @@
           <p:cNvPr id="3" name="Content Placeholder 2">
             <a:extLst>
               <a:ext uri="{FF2B5EF4-FFF2-40B4-BE49-F238E27FC236}">
-                <a16:creationId xmlns:a16="http://schemas.microsoft.com/office/drawing/2014/main" id="{7204237F-C19F-2622-8D7F-BB5C38CED69E}"/>
+                <a16:creationId xmlns:a16="http://schemas.microsoft.com/office/drawing/2014/main" id="{5BDAC2E4-CD0D-143D-0EAA-54C82B8FC24E}"/>
               </a:ext>
             </a:extLst>
           </p:cNvPr>
@@ -4380,216 +4260,171 @@
         <p:spPr/>
         <p:txBody>
           <a:bodyPr vert="horz" lIns="91440" tIns="45720" rIns="91440" bIns="45720" rtlCol="0" anchor="t">
-            <a:normAutofit fontScale="70000" lnSpcReduction="20000"/>
+            <a:normAutofit fontScale="85000" lnSpcReduction="20000"/>
           </a:bodyPr>
           <a:lstStyle/>
           <a:p>
             <a:r>
-              <a:rPr lang="en-US" dirty="0">
+              <a:rPr lang="en-US"/>
+              <a:t>Regulated Knowledge Assistant (Risk, Compliance, legal, finance &amp; other corporate functions)</a:t>
+            </a:r>
+            <a:endParaRPr lang="en-US">
+              <a:ea typeface="Calibri"/>
+              <a:cs typeface="Calibri"/>
+            </a:endParaRPr>
+          </a:p>
+          <a:p>
+            <a:r>
+              <a:rPr lang="en-US"/>
+              <a:t>What RAG enables</a:t>
+            </a:r>
+          </a:p>
+          <a:p>
+            <a:pPr lvl="1">
+              <a:buFont typeface="Calibri"/>
+              <a:buChar char="-"/>
+            </a:pPr>
+            <a:r>
+              <a:rPr lang="en-US">
                 <a:ea typeface="+mn-lt"/>
                 <a:cs typeface="+mn-lt"/>
               </a:rPr>
-              <a:t>Enterprise Reporting &amp; Explainability Layer (finance, strategy &amp; Operations)</a:t>
-            </a:r>
-          </a:p>
-          <a:p>
-            <a:r>
-              <a:rPr lang="en-US" dirty="0"/>
-              <a:t>What RAG enables</a:t>
-            </a:r>
-            <a:endParaRPr lang="en-US" dirty="0">
+              <a:t>AI answers </a:t>
+            </a:r>
+            <a:r>
+              <a:rPr lang="en-US" b="1">
+                <a:ea typeface="+mn-lt"/>
+                <a:cs typeface="+mn-lt"/>
+              </a:rPr>
+              <a:t>only from approved internal documents</a:t>
+            </a:r>
+            <a:endParaRPr lang="en-US">
               <a:ea typeface="+mn-lt"/>
               <a:cs typeface="+mn-lt"/>
             </a:endParaRPr>
           </a:p>
           <a:p>
-            <a:pPr lvl="1"/>
-            <a:r>
-              <a:rPr lang="en-US" dirty="0">
+            <a:pPr lvl="1">
+              <a:buFont typeface="Calibri"/>
+              <a:buChar char="-"/>
+            </a:pPr>
+            <a:r>
+              <a:rPr lang="en-US">
                 <a:ea typeface="+mn-lt"/>
                 <a:cs typeface="+mn-lt"/>
               </a:rPr>
-              <a:t>Natural-language explanations grounded in:</a:t>
-            </a:r>
-            <a:endParaRPr lang="en-US" dirty="0">
+              <a:t>Every answer includes </a:t>
+            </a:r>
+            <a:r>
+              <a:rPr lang="en-US" b="1">
+                <a:ea typeface="+mn-lt"/>
+                <a:cs typeface="+mn-lt"/>
+              </a:rPr>
+              <a:t>citations</a:t>
+            </a:r>
+            <a:r>
+              <a:rPr lang="en-US">
+                <a:ea typeface="+mn-lt"/>
+                <a:cs typeface="+mn-lt"/>
+              </a:rPr>
+              <a:t> (page, policy, clause)</a:t>
+            </a:r>
+          </a:p>
+          <a:p>
+            <a:pPr lvl="1">
+              <a:buFont typeface="Calibri"/>
+              <a:buChar char="-"/>
+            </a:pPr>
+            <a:r>
+              <a:rPr lang="en-US">
+                <a:ea typeface="+mn-lt"/>
+                <a:cs typeface="+mn-lt"/>
+              </a:rPr>
+              <a:t>Governance controls who can ask what</a:t>
+            </a:r>
+          </a:p>
+          <a:p>
+            <a:r>
+              <a:rPr lang="en-US"/>
+              <a:t>Business value</a:t>
+            </a:r>
+          </a:p>
+          <a:p>
+            <a:pPr lvl="1">
+              <a:buFont typeface="Calibri"/>
+              <a:buChar char="-"/>
+            </a:pPr>
+            <a:r>
+              <a:rPr lang="en-US">
+                <a:ea typeface="+mn-lt"/>
+                <a:cs typeface="+mn-lt"/>
+              </a:rPr>
+              <a:t>Faster regulatory responses</a:t>
+            </a:r>
+          </a:p>
+          <a:p>
+            <a:pPr lvl="1">
+              <a:buFont typeface="Calibri"/>
+              <a:buChar char="-"/>
+            </a:pPr>
+            <a:r>
+              <a:rPr lang="en-US">
+                <a:ea typeface="+mn-lt"/>
+                <a:cs typeface="+mn-lt"/>
+              </a:rPr>
+              <a:t>Reduced legal/compliance risk</a:t>
+            </a:r>
+          </a:p>
+          <a:p>
+            <a:pPr lvl="1">
+              <a:buFont typeface="Calibri"/>
+              <a:buChar char="-"/>
+            </a:pPr>
+            <a:r>
+              <a:rPr lang="en-US">
+                <a:ea typeface="+mn-lt"/>
+                <a:cs typeface="+mn-lt"/>
+              </a:rPr>
+              <a:t>Lower dependency on SMEs for routine queries</a:t>
+            </a:r>
+          </a:p>
+          <a:p>
+            <a:pPr lvl="1">
+              <a:buFont typeface="Calibri"/>
+              <a:buChar char="-"/>
+            </a:pPr>
+            <a:r>
+              <a:rPr lang="en-US">
+                <a:ea typeface="+mn-lt"/>
+                <a:cs typeface="+mn-lt"/>
+              </a:rPr>
+              <a:t>Executive confidence in AI-assisted decisions</a:t>
+            </a:r>
+          </a:p>
+          <a:p>
+            <a:endParaRPr lang="en-US">
+              <a:ea typeface="+mn-lt"/>
+              <a:cs typeface="+mn-lt"/>
+            </a:endParaRPr>
+          </a:p>
+          <a:p>
+            <a:endParaRPr lang="en-US">
               <a:ea typeface="Calibri"/>
               <a:cs typeface="Calibri"/>
             </a:endParaRPr>
           </a:p>
           <a:p>
-            <a:pPr lvl="2">
-              <a:buFont typeface="Wingdings"/>
-              <a:buChar char="§"/>
-            </a:pPr>
-            <a:r>
-              <a:rPr lang="en-US" dirty="0">
-                <a:ea typeface="+mn-lt"/>
-                <a:cs typeface="+mn-lt"/>
-              </a:rPr>
-              <a:t>management commentary</a:t>
-            </a:r>
-            <a:endParaRPr lang="en-US" dirty="0">
+            <a:endParaRPr lang="en-US">
               <a:ea typeface="Calibri"/>
               <a:cs typeface="Calibri"/>
             </a:endParaRPr>
           </a:p>
-          <a:p>
-            <a:pPr lvl="2">
-              <a:buFont typeface="Wingdings"/>
-              <a:buChar char="§"/>
-            </a:pPr>
-            <a:r>
-              <a:rPr lang="en-US" dirty="0">
-                <a:ea typeface="+mn-lt"/>
-                <a:cs typeface="+mn-lt"/>
-              </a:rPr>
-              <a:t>board papers</a:t>
-            </a:r>
-            <a:endParaRPr lang="en-US" dirty="0">
-              <a:ea typeface="Calibri"/>
-              <a:cs typeface="Calibri"/>
-            </a:endParaRPr>
-          </a:p>
-          <a:p>
-            <a:pPr lvl="2">
-              <a:buFont typeface="Wingdings"/>
-              <a:buChar char="§"/>
-            </a:pPr>
-            <a:r>
-              <a:rPr lang="en-US" dirty="0">
-                <a:ea typeface="+mn-lt"/>
-                <a:cs typeface="+mn-lt"/>
-              </a:rPr>
-              <a:t>analyst notes</a:t>
-            </a:r>
-            <a:endParaRPr lang="en-US" dirty="0">
-              <a:ea typeface="Calibri"/>
-              <a:cs typeface="Calibri"/>
-            </a:endParaRPr>
-          </a:p>
-          <a:p>
-            <a:pPr lvl="1"/>
-            <a:r>
-              <a:rPr lang="en-US" dirty="0">
-                <a:ea typeface="+mn-lt"/>
-                <a:cs typeface="+mn-lt"/>
-              </a:rPr>
-              <a:t>Answers tied directly to </a:t>
-            </a:r>
-            <a:r>
-              <a:rPr lang="en-US" b="1" dirty="0">
-                <a:ea typeface="+mn-lt"/>
-                <a:cs typeface="+mn-lt"/>
-              </a:rPr>
-              <a:t>source documents</a:t>
-            </a:r>
-            <a:endParaRPr lang="en-US" dirty="0">
-              <a:ea typeface="Calibri"/>
-              <a:cs typeface="Calibri"/>
-            </a:endParaRPr>
-          </a:p>
-          <a:p>
-            <a:pPr lvl="1"/>
-            <a:r>
-              <a:rPr lang="en-US" dirty="0">
-                <a:ea typeface="+mn-lt"/>
-                <a:cs typeface="+mn-lt"/>
-              </a:rPr>
-              <a:t>Consistent interpretation across teams</a:t>
-            </a:r>
-            <a:endParaRPr lang="en-US" dirty="0">
-              <a:ea typeface="Calibri"/>
-              <a:cs typeface="Calibri"/>
-            </a:endParaRPr>
-          </a:p>
-          <a:p>
-            <a:r>
-              <a:rPr lang="en-US" dirty="0"/>
-              <a:t>Business value</a:t>
-            </a:r>
-          </a:p>
-          <a:p>
-            <a:pPr lvl="1"/>
-            <a:r>
-              <a:rPr lang="en-US" dirty="0">
-                <a:ea typeface="+mn-lt"/>
-                <a:cs typeface="+mn-lt"/>
-              </a:rPr>
-              <a:t>Faster executive insight</a:t>
-            </a:r>
-            <a:endParaRPr lang="en-US" dirty="0">
-              <a:ea typeface="Calibri"/>
-              <a:cs typeface="Calibri"/>
-            </a:endParaRPr>
-          </a:p>
-          <a:p>
-            <a:pPr lvl="1"/>
-            <a:r>
-              <a:rPr lang="en-US" dirty="0">
-                <a:ea typeface="+mn-lt"/>
-                <a:cs typeface="+mn-lt"/>
-              </a:rPr>
-              <a:t>Better strategic decisions</a:t>
-            </a:r>
-            <a:endParaRPr lang="en-US" dirty="0">
-              <a:ea typeface="Calibri"/>
-              <a:cs typeface="Calibri"/>
-            </a:endParaRPr>
-          </a:p>
-          <a:p>
-            <a:pPr lvl="1"/>
-            <a:r>
-              <a:rPr lang="en-US" dirty="0">
-                <a:ea typeface="+mn-lt"/>
-                <a:cs typeface="+mn-lt"/>
-              </a:rPr>
-              <a:t>Reduced misinterpretation of numbers</a:t>
-            </a:r>
-            <a:endParaRPr lang="en-US" dirty="0">
-              <a:ea typeface="Calibri"/>
-              <a:cs typeface="Calibri"/>
-            </a:endParaRPr>
-          </a:p>
-          <a:p>
-            <a:pPr lvl="1"/>
-            <a:r>
-              <a:rPr lang="en-US" dirty="0">
-                <a:ea typeface="+mn-lt"/>
-                <a:cs typeface="+mn-lt"/>
-              </a:rPr>
-              <a:t>AI as an </a:t>
-            </a:r>
-            <a:r>
-              <a:rPr lang="en-US" i="1" dirty="0">
-                <a:ea typeface="+mn-lt"/>
-                <a:cs typeface="+mn-lt"/>
-              </a:rPr>
-              <a:t>explainability layer</a:t>
-            </a:r>
-            <a:r>
-              <a:rPr lang="en-US" dirty="0">
-                <a:ea typeface="+mn-lt"/>
-                <a:cs typeface="+mn-lt"/>
-              </a:rPr>
-              <a:t> over enterprise data</a:t>
-            </a:r>
-            <a:endParaRPr lang="en-US" dirty="0">
-              <a:ea typeface="Calibri"/>
-              <a:cs typeface="Calibri"/>
-            </a:endParaRPr>
-          </a:p>
-          <a:p>
-            <a:endParaRPr lang="en-US" dirty="0">
-              <a:ea typeface="+mn-lt"/>
-              <a:cs typeface="+mn-lt"/>
-            </a:endParaRPr>
-          </a:p>
         </p:txBody>
       </p:sp>
     </p:spTree>
     <p:extLst>
       <p:ext uri="{BB962C8B-B14F-4D97-AF65-F5344CB8AC3E}">
-        <p14:creationId xmlns:p14="http://schemas.microsoft.com/office/powerpoint/2010/main" val="1163301285"/>
+        <p14:creationId xmlns:p14="http://schemas.microsoft.com/office/powerpoint/2010/main" val="293977368"/>
       </p:ext>
     </p:extLst>
   </p:cSld>
@@ -4621,7 +4456,7 @@
           <p:cNvPr id="2" name="Title 1">
             <a:extLst>
               <a:ext uri="{FF2B5EF4-FFF2-40B4-BE49-F238E27FC236}">
-                <a16:creationId xmlns:a16="http://schemas.microsoft.com/office/drawing/2014/main" id="{F4CF624C-1003-66D5-901E-57DCE64E7A9D}"/>
+                <a16:creationId xmlns:a16="http://schemas.microsoft.com/office/drawing/2014/main" id="{36FF92C2-09A5-C977-2AAD-861A53CB0298}"/>
               </a:ext>
             </a:extLst>
           </p:cNvPr>
@@ -4638,13 +4473,13 @@
           <a:lstStyle/>
           <a:p>
             <a:r>
-              <a:rPr lang="en-US" dirty="0">
+              <a:rPr lang="en-US">
                 <a:ea typeface="Calibri"/>
                 <a:cs typeface="Calibri"/>
               </a:rPr>
-              <a:t>Enterprise Use Case 3</a:t>
-            </a:r>
-            <a:endParaRPr lang="en-US" dirty="0"/>
+              <a:t>Enterprise Use Case 2</a:t>
+            </a:r>
+            <a:endParaRPr lang="en-US"/>
           </a:p>
         </p:txBody>
       </p:sp>
@@ -4653,7 +4488,7 @@
           <p:cNvPr id="3" name="Content Placeholder 2">
             <a:extLst>
               <a:ext uri="{FF2B5EF4-FFF2-40B4-BE49-F238E27FC236}">
-                <a16:creationId xmlns:a16="http://schemas.microsoft.com/office/drawing/2014/main" id="{7EF698BE-2BAB-C5BC-EF3D-8CA808E56598}"/>
+                <a16:creationId xmlns:a16="http://schemas.microsoft.com/office/drawing/2014/main" id="{7204237F-C19F-2622-8D7F-BB5C38CED69E}"/>
               </a:ext>
             </a:extLst>
           </p:cNvPr>
@@ -4667,69 +4502,36 @@
         <p:spPr/>
         <p:txBody>
           <a:bodyPr vert="horz" lIns="91440" tIns="45720" rIns="91440" bIns="45720" rtlCol="0" anchor="t">
-            <a:normAutofit fontScale="77500" lnSpcReduction="20000"/>
+            <a:normAutofit fontScale="70000" lnSpcReduction="20000"/>
           </a:bodyPr>
           <a:lstStyle/>
           <a:p>
             <a:r>
-              <a:rPr lang="en-US" dirty="0">
+              <a:rPr lang="en-US">
                 <a:ea typeface="+mn-lt"/>
                 <a:cs typeface="+mn-lt"/>
               </a:rPr>
-              <a:t>Institutional Memory &amp; Decision Intelligence (Management, Transformation, M&amp;A)</a:t>
-            </a:r>
-          </a:p>
-          <a:p>
-            <a:r>
-              <a:rPr lang="en-US" dirty="0"/>
+              <a:t>Enterprise Reporting &amp; Explainability Layer (finance, strategy &amp; Operations)</a:t>
+            </a:r>
+          </a:p>
+          <a:p>
+            <a:r>
+              <a:rPr lang="en-US"/>
               <a:t>What RAG enables</a:t>
             </a:r>
-            <a:endParaRPr lang="en-US" dirty="0">
-              <a:ea typeface="Calibri"/>
-              <a:cs typeface="Calibri"/>
+            <a:endParaRPr lang="en-US">
+              <a:ea typeface="+mn-lt"/>
+              <a:cs typeface="+mn-lt"/>
             </a:endParaRPr>
           </a:p>
           <a:p>
             <a:pPr lvl="1"/>
             <a:r>
-              <a:rPr lang="en-US" dirty="0">
+              <a:rPr lang="en-US">
                 <a:ea typeface="+mn-lt"/>
                 <a:cs typeface="+mn-lt"/>
               </a:rPr>
-              <a:t>Ask:</a:t>
-            </a:r>
-            <a:br>
-              <a:rPr lang="en-US" dirty="0">
-                <a:ea typeface="+mn-lt"/>
-                <a:cs typeface="+mn-lt"/>
-              </a:rPr>
-            </a:br>
-            <a:r>
-              <a:rPr lang="en-US" dirty="0">
-                <a:ea typeface="+mn-lt"/>
-                <a:cs typeface="+mn-lt"/>
-              </a:rPr>
-              <a:t> </a:t>
-            </a:r>
-            <a:r>
-              <a:rPr lang="en-US" i="1" dirty="0">
-                <a:ea typeface="+mn-lt"/>
-                <a:cs typeface="+mn-lt"/>
-              </a:rPr>
-              <a:t>“Why did we choose option A in 2021?”</a:t>
-            </a:r>
-            <a:br>
-              <a:rPr lang="en-US" i="1" dirty="0">
-                <a:ea typeface="+mn-lt"/>
-                <a:cs typeface="+mn-lt"/>
-              </a:rPr>
-            </a:br>
-            <a:r>
-              <a:rPr lang="en-US" i="1" dirty="0">
-                <a:ea typeface="+mn-lt"/>
-                <a:cs typeface="+mn-lt"/>
-              </a:rPr>
-              <a:t> “What risks were identified?”</a:t>
+              <a:t>Natural-language explanations grounded in:</a:t>
             </a:r>
             <a:endParaRPr lang="en-US">
               <a:ea typeface="Calibri"/>
@@ -4737,20 +4539,16 @@
             </a:endParaRPr>
           </a:p>
           <a:p>
-            <a:pPr lvl="1"/>
-            <a:r>
-              <a:rPr lang="en-US" dirty="0">
+            <a:pPr lvl="2">
+              <a:buFont typeface="Wingdings"/>
+              <a:buChar char="§"/>
+            </a:pPr>
+            <a:r>
+              <a:rPr lang="en-US">
                 <a:ea typeface="+mn-lt"/>
                 <a:cs typeface="+mn-lt"/>
               </a:rPr>
-              <a:t>Answers grounded in </a:t>
-            </a:r>
-            <a:r>
-              <a:rPr lang="en-US" b="1" dirty="0">
-                <a:ea typeface="+mn-lt"/>
-                <a:cs typeface="+mn-lt"/>
-              </a:rPr>
-              <a:t>original decision artifacts</a:t>
+              <a:t>management commentary</a:t>
             </a:r>
             <a:endParaRPr lang="en-US">
               <a:ea typeface="Calibri"/>
@@ -4758,20 +4556,16 @@
             </a:endParaRPr>
           </a:p>
           <a:p>
-            <a:pPr lvl="1"/>
-            <a:r>
-              <a:rPr lang="en-US" dirty="0">
+            <a:pPr lvl="2">
+              <a:buFont typeface="Wingdings"/>
+              <a:buChar char="§"/>
+            </a:pPr>
+            <a:r>
+              <a:rPr lang="en-US">
                 <a:ea typeface="+mn-lt"/>
                 <a:cs typeface="+mn-lt"/>
               </a:rPr>
-              <a:t>AI becomes a </a:t>
-            </a:r>
-            <a:r>
-              <a:rPr lang="en-US" b="1" dirty="0">
-                <a:ea typeface="+mn-lt"/>
-                <a:cs typeface="+mn-lt"/>
-              </a:rPr>
-              <a:t>corporate memory system</a:t>
+              <a:t>board papers</a:t>
             </a:r>
             <a:endParaRPr lang="en-US">
               <a:ea typeface="Calibri"/>
@@ -4779,11 +4573,18 @@
             </a:endParaRPr>
           </a:p>
           <a:p>
-            <a:r>
-              <a:rPr lang="en-US" dirty="0"/>
-              <a:t>Business value</a:t>
-            </a:r>
-            <a:endParaRPr lang="en-US" dirty="0">
+            <a:pPr lvl="2">
+              <a:buFont typeface="Wingdings"/>
+              <a:buChar char="§"/>
+            </a:pPr>
+            <a:r>
+              <a:rPr lang="en-US">
+                <a:ea typeface="+mn-lt"/>
+                <a:cs typeface="+mn-lt"/>
+              </a:rPr>
+              <a:t>analyst notes</a:t>
+            </a:r>
+            <a:endParaRPr lang="en-US">
               <a:ea typeface="Calibri"/>
               <a:cs typeface="Calibri"/>
             </a:endParaRPr>
@@ -4791,13 +4592,20 @@
           <a:p>
             <a:pPr lvl="1"/>
             <a:r>
-              <a:rPr lang="en-US" dirty="0">
+              <a:rPr lang="en-US">
                 <a:ea typeface="+mn-lt"/>
                 <a:cs typeface="+mn-lt"/>
               </a:rPr>
-              <a:t>Better long-term decision quality</a:t>
-            </a:r>
-            <a:endParaRPr lang="en-US" dirty="0">
+              <a:t>Answers tied directly to </a:t>
+            </a:r>
+            <a:r>
+              <a:rPr lang="en-US" b="1">
+                <a:ea typeface="+mn-lt"/>
+                <a:cs typeface="+mn-lt"/>
+              </a:rPr>
+              <a:t>source documents</a:t>
+            </a:r>
+            <a:endParaRPr lang="en-US">
               <a:ea typeface="Calibri"/>
               <a:cs typeface="Calibri"/>
             </a:endParaRPr>
@@ -4805,27 +4613,33 @@
           <a:p>
             <a:pPr lvl="1"/>
             <a:r>
-              <a:rPr lang="en-US" dirty="0">
+              <a:rPr lang="en-US">
                 <a:ea typeface="+mn-lt"/>
                 <a:cs typeface="+mn-lt"/>
               </a:rPr>
-              <a:t>Faster executive onboarding</a:t>
-            </a:r>
-            <a:endParaRPr lang="en-US" dirty="0">
+              <a:t>Consistent interpretation across teams</a:t>
+            </a:r>
+            <a:endParaRPr lang="en-US">
               <a:ea typeface="Calibri"/>
               <a:cs typeface="Calibri"/>
             </a:endParaRPr>
           </a:p>
           <a:p>
+            <a:r>
+              <a:rPr lang="en-US"/>
+              <a:t>Business value</a:t>
+            </a:r>
+          </a:p>
+          <a:p>
             <a:pPr lvl="1"/>
             <a:r>
-              <a:rPr lang="en-US" dirty="0">
+              <a:rPr lang="en-US">
                 <a:ea typeface="+mn-lt"/>
                 <a:cs typeface="+mn-lt"/>
               </a:rPr>
-              <a:t>Reduced strategic drift</a:t>
-            </a:r>
-            <a:endParaRPr lang="en-US" dirty="0">
+              <a:t>Faster executive insight</a:t>
+            </a:r>
+            <a:endParaRPr lang="en-US">
               <a:ea typeface="Calibri"/>
               <a:cs typeface="Calibri"/>
             </a:endParaRPr>
@@ -4833,29 +4647,71 @@
           <a:p>
             <a:pPr lvl="1"/>
             <a:r>
-              <a:rPr lang="en-US" dirty="0">
+              <a:rPr lang="en-US">
                 <a:ea typeface="+mn-lt"/>
                 <a:cs typeface="+mn-lt"/>
               </a:rPr>
-              <a:t>Preservation of organizational knowledge</a:t>
-            </a:r>
-            <a:endParaRPr lang="en-US" dirty="0">
+              <a:t>Better strategic decisions</a:t>
+            </a:r>
+            <a:endParaRPr lang="en-US">
               <a:ea typeface="Calibri"/>
               <a:cs typeface="Calibri"/>
             </a:endParaRPr>
           </a:p>
           <a:p>
-            <a:endParaRPr lang="en-US" dirty="0">
+            <a:pPr lvl="1"/>
+            <a:r>
+              <a:rPr lang="en-US">
+                <a:ea typeface="+mn-lt"/>
+                <a:cs typeface="+mn-lt"/>
+              </a:rPr>
+              <a:t>Reduced misinterpretation of numbers</a:t>
+            </a:r>
+            <a:endParaRPr lang="en-US">
               <a:ea typeface="Calibri"/>
               <a:cs typeface="Calibri"/>
             </a:endParaRPr>
           </a:p>
+          <a:p>
+            <a:pPr lvl="1"/>
+            <a:r>
+              <a:rPr lang="en-US">
+                <a:ea typeface="+mn-lt"/>
+                <a:cs typeface="+mn-lt"/>
+              </a:rPr>
+              <a:t>AI as an </a:t>
+            </a:r>
+            <a:r>
+              <a:rPr lang="en-US" i="1">
+                <a:ea typeface="+mn-lt"/>
+                <a:cs typeface="+mn-lt"/>
+              </a:rPr>
+              <a:t>explainability layer</a:t>
+            </a:r>
+            <a:r>
+              <a:rPr lang="en-US">
+                <a:ea typeface="+mn-lt"/>
+                <a:cs typeface="+mn-lt"/>
+              </a:rPr>
+              <a:t> over enterprise data</a:t>
+            </a:r>
+            <a:endParaRPr lang="en-US">
+              <a:ea typeface="Calibri"/>
+              <a:cs typeface="Calibri"/>
+            </a:endParaRPr>
+          </a:p>
+          <a:p>
+            <a:endParaRPr lang="en-US">
+              <a:ea typeface="+mn-lt"/>
+              <a:cs typeface="+mn-lt"/>
+            </a:endParaRPr>
+          </a:p>
         </p:txBody>
       </p:sp>
     </p:spTree>
     <p:extLst>
       <p:ext uri="{BB962C8B-B14F-4D97-AF65-F5344CB8AC3E}">
-        <p14:creationId xmlns:p14="http://schemas.microsoft.com/office/powerpoint/2010/main" val="2014409598"/>
+        <p14:creationId xmlns:p14="http://schemas.microsoft.com/office/powerpoint/2010/main" val="1163301285"/>
       </p:ext>
     </p:extLst>
   </p:cSld>
@@ -4884,7 +4740,13 @@
       </p:grpSpPr>
       <p:sp>
         <p:nvSpPr>
-          <p:cNvPr id="2" name="Title 1"/>
+          <p:cNvPr id="2" name="Title 1">
+            <a:extLst>
+              <a:ext uri="{FF2B5EF4-FFF2-40B4-BE49-F238E27FC236}">
+                <a16:creationId xmlns:a16="http://schemas.microsoft.com/office/drawing/2014/main" id="{F4CF624C-1003-66D5-901E-57DCE64E7A9D}"/>
+              </a:ext>
+            </a:extLst>
+          </p:cNvPr>
           <p:cNvSpPr>
             <a:spLocks noGrp="1"/>
           </p:cNvSpPr>
@@ -4898,14 +4760,25 @@
           <a:lstStyle/>
           <a:p>
             <a:r>
-              <a:t>High-Level RAG Architecture</a:t>
-            </a:r>
-          </a:p>
-        </p:txBody>
-      </p:sp>
-      <p:sp>
-        <p:nvSpPr>
-          <p:cNvPr id="3" name="Content Placeholder 2"/>
+              <a:rPr lang="en-US">
+                <a:ea typeface="Calibri"/>
+                <a:cs typeface="Calibri"/>
+              </a:rPr>
+              <a:t>Enterprise Use Case 3</a:t>
+            </a:r>
+            <a:endParaRPr lang="en-US"/>
+          </a:p>
+        </p:txBody>
+      </p:sp>
+      <p:sp>
+        <p:nvSpPr>
+          <p:cNvPr id="3" name="Content Placeholder 2">
+            <a:extLst>
+              <a:ext uri="{FF2B5EF4-FFF2-40B4-BE49-F238E27FC236}">
+                <a16:creationId xmlns:a16="http://schemas.microsoft.com/office/drawing/2014/main" id="{7EF698BE-2BAB-C5BC-EF3D-8CA808E56598}"/>
+              </a:ext>
+            </a:extLst>
+          </p:cNvPr>
           <p:cNvSpPr>
             <a:spLocks noGrp="1"/>
           </p:cNvSpPr>
@@ -4915,26 +4788,198 @@
         </p:nvSpPr>
         <p:spPr/>
         <p:txBody>
-          <a:bodyPr/>
-          <a:lstStyle/>
-          <a:p>
-            <a:r>
-              <a:t>Documents → Indexing → Vector Database</a:t>
-            </a:r>
-          </a:p>
-          <a:p>
-            <a:r>
-              <a:t>User Question → Retrieval → LLM Answer</a:t>
-            </a:r>
-          </a:p>
-          <a:p>
-            <a:r>
-              <a:t>Two distinct phases: Indexing and Querying</a:t>
-            </a:r>
+          <a:bodyPr vert="horz" lIns="91440" tIns="45720" rIns="91440" bIns="45720" rtlCol="0" anchor="t">
+            <a:normAutofit fontScale="77500" lnSpcReduction="20000"/>
+          </a:bodyPr>
+          <a:lstStyle/>
+          <a:p>
+            <a:r>
+              <a:rPr lang="en-US">
+                <a:ea typeface="+mn-lt"/>
+                <a:cs typeface="+mn-lt"/>
+              </a:rPr>
+              <a:t>Institutional Memory &amp; Decision Intelligence (Management, Transformation, M&amp;A)</a:t>
+            </a:r>
+          </a:p>
+          <a:p>
+            <a:r>
+              <a:rPr lang="en-US"/>
+              <a:t>What RAG enables</a:t>
+            </a:r>
+            <a:endParaRPr lang="en-US">
+              <a:ea typeface="Calibri"/>
+              <a:cs typeface="Calibri"/>
+            </a:endParaRPr>
+          </a:p>
+          <a:p>
+            <a:pPr lvl="1"/>
+            <a:r>
+              <a:rPr lang="en-US">
+                <a:ea typeface="+mn-lt"/>
+                <a:cs typeface="+mn-lt"/>
+              </a:rPr>
+              <a:t>Ask:</a:t>
+            </a:r>
+            <a:br>
+              <a:rPr lang="en-US">
+                <a:ea typeface="+mn-lt"/>
+                <a:cs typeface="+mn-lt"/>
+              </a:rPr>
+            </a:br>
+            <a:r>
+              <a:rPr lang="en-US">
+                <a:ea typeface="+mn-lt"/>
+                <a:cs typeface="+mn-lt"/>
+              </a:rPr>
+              <a:t> </a:t>
+            </a:r>
+            <a:r>
+              <a:rPr lang="en-US" i="1">
+                <a:ea typeface="+mn-lt"/>
+                <a:cs typeface="+mn-lt"/>
+              </a:rPr>
+              <a:t>“Why did we choose option A in 2021?”</a:t>
+            </a:r>
+            <a:br>
+              <a:rPr lang="en-US" i="1">
+                <a:ea typeface="+mn-lt"/>
+                <a:cs typeface="+mn-lt"/>
+              </a:rPr>
+            </a:br>
+            <a:r>
+              <a:rPr lang="en-US" i="1">
+                <a:ea typeface="+mn-lt"/>
+                <a:cs typeface="+mn-lt"/>
+              </a:rPr>
+              <a:t> “What risks were identified?”</a:t>
+            </a:r>
+            <a:endParaRPr lang="en-US">
+              <a:ea typeface="Calibri"/>
+              <a:cs typeface="Calibri"/>
+            </a:endParaRPr>
+          </a:p>
+          <a:p>
+            <a:pPr lvl="1"/>
+            <a:r>
+              <a:rPr lang="en-US">
+                <a:ea typeface="+mn-lt"/>
+                <a:cs typeface="+mn-lt"/>
+              </a:rPr>
+              <a:t>Answers grounded in </a:t>
+            </a:r>
+            <a:r>
+              <a:rPr lang="en-US" b="1">
+                <a:ea typeface="+mn-lt"/>
+                <a:cs typeface="+mn-lt"/>
+              </a:rPr>
+              <a:t>original decision artifacts</a:t>
+            </a:r>
+            <a:endParaRPr lang="en-US">
+              <a:ea typeface="Calibri"/>
+              <a:cs typeface="Calibri"/>
+            </a:endParaRPr>
+          </a:p>
+          <a:p>
+            <a:pPr lvl="1"/>
+            <a:r>
+              <a:rPr lang="en-US">
+                <a:ea typeface="+mn-lt"/>
+                <a:cs typeface="+mn-lt"/>
+              </a:rPr>
+              <a:t>AI becomes a </a:t>
+            </a:r>
+            <a:r>
+              <a:rPr lang="en-US" b="1">
+                <a:ea typeface="+mn-lt"/>
+                <a:cs typeface="+mn-lt"/>
+              </a:rPr>
+              <a:t>corporate memory system</a:t>
+            </a:r>
+            <a:endParaRPr lang="en-US">
+              <a:ea typeface="Calibri"/>
+              <a:cs typeface="Calibri"/>
+            </a:endParaRPr>
+          </a:p>
+          <a:p>
+            <a:r>
+              <a:rPr lang="en-US"/>
+              <a:t>Business value</a:t>
+            </a:r>
+            <a:endParaRPr lang="en-US">
+              <a:ea typeface="Calibri"/>
+              <a:cs typeface="Calibri"/>
+            </a:endParaRPr>
+          </a:p>
+          <a:p>
+            <a:pPr lvl="1"/>
+            <a:r>
+              <a:rPr lang="en-US">
+                <a:ea typeface="+mn-lt"/>
+                <a:cs typeface="+mn-lt"/>
+              </a:rPr>
+              <a:t>Better long-term decision quality</a:t>
+            </a:r>
+            <a:endParaRPr lang="en-US">
+              <a:ea typeface="Calibri"/>
+              <a:cs typeface="Calibri"/>
+            </a:endParaRPr>
+          </a:p>
+          <a:p>
+            <a:pPr lvl="1"/>
+            <a:r>
+              <a:rPr lang="en-US">
+                <a:ea typeface="+mn-lt"/>
+                <a:cs typeface="+mn-lt"/>
+              </a:rPr>
+              <a:t>Faster executive onboarding</a:t>
+            </a:r>
+            <a:endParaRPr lang="en-US">
+              <a:ea typeface="Calibri"/>
+              <a:cs typeface="Calibri"/>
+            </a:endParaRPr>
+          </a:p>
+          <a:p>
+            <a:pPr lvl="1"/>
+            <a:r>
+              <a:rPr lang="en-US">
+                <a:ea typeface="+mn-lt"/>
+                <a:cs typeface="+mn-lt"/>
+              </a:rPr>
+              <a:t>Reduced strategic drift</a:t>
+            </a:r>
+            <a:endParaRPr lang="en-US">
+              <a:ea typeface="Calibri"/>
+              <a:cs typeface="Calibri"/>
+            </a:endParaRPr>
+          </a:p>
+          <a:p>
+            <a:pPr lvl="1"/>
+            <a:r>
+              <a:rPr lang="en-US">
+                <a:ea typeface="+mn-lt"/>
+                <a:cs typeface="+mn-lt"/>
+              </a:rPr>
+              <a:t>Preservation of organizational knowledge</a:t>
+            </a:r>
+            <a:endParaRPr lang="en-US">
+              <a:ea typeface="Calibri"/>
+              <a:cs typeface="Calibri"/>
+            </a:endParaRPr>
+          </a:p>
+          <a:p>
+            <a:endParaRPr lang="en-US">
+              <a:ea typeface="Calibri"/>
+              <a:cs typeface="Calibri"/>
+            </a:endParaRPr>
           </a:p>
         </p:txBody>
       </p:sp>
     </p:spTree>
+    <p:extLst>
+      <p:ext uri="{BB962C8B-B14F-4D97-AF65-F5344CB8AC3E}">
+        <p14:creationId xmlns:p14="http://schemas.microsoft.com/office/powerpoint/2010/main" val="2014409598"/>
+      </p:ext>
+    </p:extLst>
   </p:cSld>
   <p:clrMapOvr>
     <a:masterClrMapping/>
@@ -4975,7 +5020,7 @@
           <a:lstStyle/>
           <a:p>
             <a:r>
-              <a:t>Indexing Phase (index.py)</a:t>
+              <a:t>High-Level RAG Architecture</a:t>
             </a:r>
           </a:p>
         </p:txBody>
@@ -4996,22 +5041,17 @@
           <a:lstStyle/>
           <a:p>
             <a:r>
-              <a:t>Runs offline or when documents change</a:t>
-            </a:r>
-          </a:p>
-          <a:p>
-            <a:r>
-              <a:t>Reads documents and extracts text</a:t>
-            </a:r>
-          </a:p>
-          <a:p>
-            <a:r>
-              <a:t>Splits text into chunks</a:t>
-            </a:r>
-          </a:p>
-          <a:p>
-            <a:r>
-              <a:t>Creates embeddings and stores them in a vector database</a:t>
+              <a:t>Documents → Indexing → Vector Database</a:t>
+            </a:r>
+          </a:p>
+          <a:p>
+            <a:r>
+              <a:t>User Question → Retrieval → LLM Answer</a:t>
+            </a:r>
+          </a:p>
+          <a:p>
+            <a:r>
+              <a:t>Two distinct phases: Indexing and Querying</a:t>
             </a:r>
           </a:p>
         </p:txBody>
@@ -5057,7 +5097,7 @@
           <a:lstStyle/>
           <a:p>
             <a:r>
-              <a:t>Why Chunking Matters</a:t>
+              <a:t>Indexing Phase (index.py)</a:t>
             </a:r>
           </a:p>
         </p:txBody>
@@ -5078,17 +5118,22 @@
           <a:lstStyle/>
           <a:p>
             <a:r>
-              <a:t>LLMs have input size limits</a:t>
-            </a:r>
-          </a:p>
-          <a:p>
-            <a:r>
-              <a:t>Smaller chunks improve retrieval accuracy</a:t>
-            </a:r>
-          </a:p>
-          <a:p>
-            <a:r>
-              <a:t>Industry systems retrieve chunks, not full documents</a:t>
+              <a:t>Runs offline or when documents change</a:t>
+            </a:r>
+          </a:p>
+          <a:p>
+            <a:r>
+              <a:t>Reads documents and extracts text</a:t>
+            </a:r>
+          </a:p>
+          <a:p>
+            <a:r>
+              <a:t>Splits text into chunks</a:t>
+            </a:r>
+          </a:p>
+          <a:p>
+            <a:r>
+              <a:t>Creates embeddings and stores them in a vector database</a:t>
             </a:r>
           </a:p>
         </p:txBody>

</xml_diff>